<commit_message>
Coordinator update: pptx, Arima_model, and models_arima
</commit_message>
<xml_diff>
--- a/Capstone_Review_2.pptx
+++ b/Capstone_Review_2.pptx
@@ -11488,7 +11488,7 @@
             <a:pPr lvl="0" algn="ctr"/>
             <a:r>
               <a:rPr lang="en-US" dirty="0"/>
-              <a:t>Wheat Price Forecasting: Region-Wise Estimator</a:t>
+              <a:t>Crop Price Forecasting: Region-Wise Estimator</a:t>
             </a:r>
             <a:endParaRPr dirty="0">
               <a:solidFill>
@@ -17035,8 +17035,8 @@
         </p:nvSpPr>
         <p:spPr>
           <a:xfrm>
-            <a:off x="805544" y="1328057"/>
-            <a:ext cx="9176656" cy="3108543"/>
+            <a:off x="805543" y="1328057"/>
+            <a:ext cx="10745325" cy="3939540"/>
           </a:xfrm>
           <a:prstGeom prst="rect">
             <a:avLst/>
@@ -17049,28 +17049,20 @@
           </a:bodyPr>
           <a:lstStyle/>
           <a:p>
-            <a:r>
-              <a:rPr lang="en-US" sz="2800" dirty="0">
-                <a:latin typeface="Cambria" panose="02040503050406030204" pitchFamily="18" charset="0"/>
-                <a:ea typeface="Cambria" panose="02040503050406030204" pitchFamily="18" charset="0"/>
-              </a:rPr>
-              <a:t>Farmers and </a:t>
-            </a:r>
-            <a:r>
-              <a:rPr lang="en-US" sz="2800" dirty="0" err="1">
-                <a:latin typeface="Cambria" panose="02040503050406030204" pitchFamily="18" charset="0"/>
-                <a:ea typeface="Cambria" panose="02040503050406030204" pitchFamily="18" charset="0"/>
-              </a:rPr>
-              <a:t>agri</a:t>
-            </a:r>
-            <a:r>
-              <a:rPr lang="en-US" sz="2800" dirty="0">
-                <a:latin typeface="Cambria" panose="02040503050406030204" pitchFamily="18" charset="0"/>
-                <a:ea typeface="Cambria" panose="02040503050406030204" pitchFamily="18" charset="0"/>
-              </a:rPr>
-              <a:t>-traders face challenges in predicting future demand and prices of organic crops. Existing systems mostly provide historical data or advisory services, but lack reliable market estimation and forecasting tools. This results in poor crop planning, financial losses, and uncertainty in the organic agriculture sector.</a:t>
-            </a:r>
-            <a:endParaRPr lang="en-IN" sz="2800" dirty="0">
+            <a:pPr algn="just"/>
+            <a:r>
+              <a:rPr lang="en-US" sz="2500" dirty="0"/>
+              <a:t>Crop prices show continuous fluctuations across regions, creating uncertainty for farmers and market participants. These variations arise from temporal patterns such as seasonality, trends, and sudden price shocks. However, most stakeholders rely on limited or ad-hoc information, leading to poor decision-making and financial risks. Since historical market prices already reflect these dynamics, there is a need for a </a:t>
+            </a:r>
+            <a:r>
+              <a:rPr lang="en-US" sz="2500" b="1" dirty="0"/>
+              <a:t>region-wise forecasting system that leverages past price movements alone</a:t>
+            </a:r>
+            <a:r>
+              <a:rPr lang="en-US" sz="2500" dirty="0"/>
+              <a:t> to predict future prices accurately. Such a framework would provide stakeholders with reliable insights while keeping the model simple and data-driven.</a:t>
+            </a:r>
+            <a:endParaRPr lang="en-IN" sz="2500" dirty="0">
               <a:latin typeface="Cambria" panose="02040503050406030204" pitchFamily="18" charset="0"/>
               <a:ea typeface="Cambria" panose="02040503050406030204" pitchFamily="18" charset="0"/>
             </a:endParaRPr>
@@ -17175,8 +17167,8 @@
         </p:nvSpPr>
         <p:spPr bwMode="auto">
           <a:xfrm>
-            <a:off x="953588" y="1087102"/>
-            <a:ext cx="8564880" cy="4893647"/>
+            <a:off x="711850" y="1223625"/>
+            <a:ext cx="8564880" cy="2308324"/>
           </a:xfrm>
           <a:prstGeom prst="rect">
             <a:avLst/>
@@ -17251,7 +17243,29 @@
                 <a:effectLst/>
                 <a:latin typeface="Arial" panose="020B0604020202020204" pitchFamily="34" charset="0"/>
               </a:rPr>
-              <a:t>Collect and preprocess district-wise wheat price datasets across Karnataka.</a:t>
+              <a:t>Collect and preprocess district-wise </a:t>
+            </a:r>
+            <a:r>
+              <a:rPr lang="en-US" altLang="en-US" sz="2400" dirty="0">
+                <a:solidFill>
+                  <a:schemeClr val="tx1"/>
+                </a:solidFill>
+                <a:latin typeface="Arial" panose="020B0604020202020204" pitchFamily="34" charset="0"/>
+              </a:rPr>
+              <a:t>crop</a:t>
+            </a:r>
+            <a:r>
+              <a:rPr kumimoji="0" lang="en-US" altLang="en-US" sz="2400" i="0" u="none" strike="noStrike" cap="none" normalizeH="0" baseline="0" dirty="0">
+                <a:ln>
+                  <a:noFill/>
+                </a:ln>
+                <a:solidFill>
+                  <a:schemeClr val="tx1"/>
+                </a:solidFill>
+                <a:effectLst/>
+                <a:latin typeface="Arial" panose="020B0604020202020204" pitchFamily="34" charset="0"/>
+              </a:rPr>
+              <a:t> price datasets across Karnataka.</a:t>
             </a:r>
           </a:p>
           <a:p>
@@ -17282,7 +17296,7 @@
                 <a:effectLst/>
                 <a:latin typeface="Arial" panose="020B0604020202020204" pitchFamily="34" charset="0"/>
               </a:rPr>
-              <a:t>Implement and evaluate deep learning models (LSTM and GRU) on sequential price data to establish baseline performance.</a:t>
+              <a:t>Implement and evaluate deep learning models  on sequential price data to establish baseline performance.</a:t>
             </a:r>
           </a:p>
           <a:p>
@@ -17313,69 +17327,7 @@
                 <a:effectLst/>
                 <a:latin typeface="Arial" panose="020B0604020202020204" pitchFamily="34" charset="0"/>
               </a:rPr>
-              <a:t>Develop and finalize a Temporal Attention Transformer (TAT) for improved region-wise wheat price forecasting.</a:t>
-            </a:r>
-          </a:p>
-          <a:p>
-            <a:pPr marL="342900" marR="0" lvl="0" indent="-342900" algn="l" defTabSz="914400" rtl="0" eaLnBrk="0" fontAlgn="base" latinLnBrk="0" hangingPunct="0">
-              <a:lnSpc>
-                <a:spcPct val="100000"/>
-              </a:lnSpc>
-              <a:spcBef>
-                <a:spcPct val="0"/>
-              </a:spcBef>
-              <a:spcAft>
-                <a:spcPct val="0"/>
-              </a:spcAft>
-              <a:buClrTx/>
-              <a:buSzTx/>
-              <a:buFont typeface="Wingdings" panose="05000000000000000000" pitchFamily="2" charset="2"/>
-              <a:buChar char="Ø"/>
-              <a:tabLst/>
-            </a:pPr>
-            <a:r>
-              <a:rPr kumimoji="0" lang="en-US" altLang="en-US" sz="2400" i="0" u="none" strike="noStrike" cap="none" normalizeH="0" baseline="0" dirty="0">
-                <a:ln>
-                  <a:noFill/>
-                </a:ln>
-                <a:solidFill>
-                  <a:schemeClr val="tx1"/>
-                </a:solidFill>
-                <a:effectLst/>
-                <a:latin typeface="Arial" panose="020B0604020202020204" pitchFamily="34" charset="0"/>
-              </a:rPr>
-              <a:t>Build an interactive dashboard (HTML/JS + Flask backend) to visualize historical and forecasted wheat prices for each district.</a:t>
-            </a:r>
-          </a:p>
-          <a:p>
-            <a:pPr marL="342900" marR="0" lvl="0" indent="-342900" algn="l" defTabSz="914400" rtl="0" eaLnBrk="0" fontAlgn="base" latinLnBrk="0" hangingPunct="0">
-              <a:lnSpc>
-                <a:spcPct val="100000"/>
-              </a:lnSpc>
-              <a:spcBef>
-                <a:spcPct val="0"/>
-              </a:spcBef>
-              <a:spcAft>
-                <a:spcPct val="0"/>
-              </a:spcAft>
-              <a:buClrTx/>
-              <a:buSzTx/>
-              <a:buFont typeface="Wingdings" panose="05000000000000000000" pitchFamily="2" charset="2"/>
-              <a:buChar char="Ø"/>
-              <a:tabLst/>
-            </a:pPr>
-            <a:r>
-              <a:rPr kumimoji="0" lang="en-US" altLang="en-US" sz="2400" i="0" u="none" strike="noStrike" cap="none" normalizeH="0" baseline="0" dirty="0">
-                <a:ln>
-                  <a:noFill/>
-                </a:ln>
-                <a:solidFill>
-                  <a:schemeClr val="tx1"/>
-                </a:solidFill>
-                <a:effectLst/>
-                <a:latin typeface="Arial" panose="020B0604020202020204" pitchFamily="34" charset="0"/>
-              </a:rPr>
-              <a:t>Deliver actionable insights on price movements and volatility to support farmers, policymakers, and stakeholders in decision-making.</a:t>
+              <a:t>Design and develop a price forecasting model for improved region-wise agricultural crop price forecasting.</a:t>
             </a:r>
           </a:p>
         </p:txBody>

</xml_diff>